<commit_message>
fix some bugs and pptx
</commit_message>
<xml_diff>
--- a/__tests__/files/loader.pptx
+++ b/__tests__/files/loader.pptx
@@ -6,6 +6,7 @@
   </p:sldMasterIdLst>
   <p:sldIdLst>
     <p:sldId id="256" r:id="rId2"/>
+    <p:sldId id="257" r:id="rId3"/>
   </p:sldIdLst>
   <p:sldSz cx="9144000" cy="6858000" type="screen4x3"/>
   <p:notesSz cx="6858000" cy="9144000"/>
@@ -104,6 +105,22 @@
       </a:defRPr>
     </a:lvl9pPr>
   </p:defaultTextStyle>
+  <p:extLst>
+    <p:ext uri="{EFAFB233-063F-42B5-8137-9DF3F51BA10A}">
+      <p15:sldGuideLst xmlns:p15="http://schemas.microsoft.com/office/powerpoint/2012/main">
+        <p15:guide id="1" orient="horz" pos="2160">
+          <p15:clr>
+            <a:srgbClr val="A4A3A4"/>
+          </p15:clr>
+        </p15:guide>
+        <p15:guide id="2" pos="2880">
+          <p15:clr>
+            <a:srgbClr val="A4A3A4"/>
+          </p15:clr>
+        </p15:guide>
+      </p15:sldGuideLst>
+    </p:ext>
+  </p:extLst>
 </p:presentation>
 </file>
 
@@ -145,10 +162,9 @@
           <a:lstStyle/>
           <a:p>
             <a:r>
-              <a:rPr lang="en-US" smtClean="0"/>
+              <a:rPr lang="en-US"/>
               <a:t>Click to edit Master title style</a:t>
             </a:r>
-            <a:endParaRPr lang="en-US"/>
           </a:p>
         </p:txBody>
       </p:sp>
@@ -264,10 +280,9 @@
           </a:lstStyle>
           <a:p>
             <a:r>
-              <a:rPr lang="en-US" smtClean="0"/>
+              <a:rPr lang="en-US"/>
               <a:t>Click to edit Master subtitle style</a:t>
             </a:r>
-            <a:endParaRPr lang="en-US"/>
           </a:p>
         </p:txBody>
       </p:sp>
@@ -288,7 +303,7 @@
           <a:p>
             <a:fld id="{A8BA42CD-F487-0240-8209-992C51929464}" type="datetimeFigureOut">
               <a:rPr lang="en-US" smtClean="0"/>
-              <a:t>1/5/17</a:t>
+              <a:t>5/1/24</a:t>
             </a:fld>
             <a:endParaRPr lang="en-US"/>
           </a:p>
@@ -382,10 +397,9 @@
           <a:lstStyle/>
           <a:p>
             <a:r>
-              <a:rPr lang="en-US" smtClean="0"/>
+              <a:rPr lang="en-US"/>
               <a:t>Click to edit Master title style</a:t>
             </a:r>
-            <a:endParaRPr lang="en-US"/>
           </a:p>
         </p:txBody>
       </p:sp>
@@ -406,38 +420,37 @@
           <a:p>
             <a:pPr lvl="0"/>
             <a:r>
-              <a:rPr lang="en-US" smtClean="0"/>
+              <a:rPr lang="en-US"/>
               <a:t>Click to edit Master text styles</a:t>
             </a:r>
           </a:p>
           <a:p>
             <a:pPr lvl="1"/>
             <a:r>
-              <a:rPr lang="en-US" smtClean="0"/>
+              <a:rPr lang="en-US"/>
               <a:t>Second level</a:t>
             </a:r>
           </a:p>
           <a:p>
             <a:pPr lvl="2"/>
             <a:r>
-              <a:rPr lang="en-US" smtClean="0"/>
+              <a:rPr lang="en-US"/>
               <a:t>Third level</a:t>
             </a:r>
           </a:p>
           <a:p>
             <a:pPr lvl="3"/>
             <a:r>
-              <a:rPr lang="en-US" smtClean="0"/>
+              <a:rPr lang="en-US"/>
               <a:t>Fourth level</a:t>
             </a:r>
           </a:p>
           <a:p>
             <a:pPr lvl="4"/>
             <a:r>
-              <a:rPr lang="en-US" smtClean="0"/>
+              <a:rPr lang="en-US"/>
               <a:t>Fifth level</a:t>
             </a:r>
-            <a:endParaRPr lang="en-US"/>
           </a:p>
         </p:txBody>
       </p:sp>
@@ -458,7 +471,7 @@
           <a:p>
             <a:fld id="{A8BA42CD-F487-0240-8209-992C51929464}" type="datetimeFigureOut">
               <a:rPr lang="en-US" smtClean="0"/>
-              <a:t>1/5/17</a:t>
+              <a:t>5/1/24</a:t>
             </a:fld>
             <a:endParaRPr lang="en-US"/>
           </a:p>
@@ -557,10 +570,9 @@
           <a:lstStyle/>
           <a:p>
             <a:r>
-              <a:rPr lang="en-US" smtClean="0"/>
+              <a:rPr lang="en-US"/>
               <a:t>Click to edit Master title style</a:t>
             </a:r>
-            <a:endParaRPr lang="en-US"/>
           </a:p>
         </p:txBody>
       </p:sp>
@@ -586,38 +598,37 @@
           <a:p>
             <a:pPr lvl="0"/>
             <a:r>
-              <a:rPr lang="en-US" smtClean="0"/>
+              <a:rPr lang="en-US"/>
               <a:t>Click to edit Master text styles</a:t>
             </a:r>
           </a:p>
           <a:p>
             <a:pPr lvl="1"/>
             <a:r>
-              <a:rPr lang="en-US" smtClean="0"/>
+              <a:rPr lang="en-US"/>
               <a:t>Second level</a:t>
             </a:r>
           </a:p>
           <a:p>
             <a:pPr lvl="2"/>
             <a:r>
-              <a:rPr lang="en-US" smtClean="0"/>
+              <a:rPr lang="en-US"/>
               <a:t>Third level</a:t>
             </a:r>
           </a:p>
           <a:p>
             <a:pPr lvl="3"/>
             <a:r>
-              <a:rPr lang="en-US" smtClean="0"/>
+              <a:rPr lang="en-US"/>
               <a:t>Fourth level</a:t>
             </a:r>
           </a:p>
           <a:p>
             <a:pPr lvl="4"/>
             <a:r>
-              <a:rPr lang="en-US" smtClean="0"/>
+              <a:rPr lang="en-US"/>
               <a:t>Fifth level</a:t>
             </a:r>
-            <a:endParaRPr lang="en-US"/>
           </a:p>
         </p:txBody>
       </p:sp>
@@ -638,7 +649,7 @@
           <a:p>
             <a:fld id="{A8BA42CD-F487-0240-8209-992C51929464}" type="datetimeFigureOut">
               <a:rPr lang="en-US" smtClean="0"/>
-              <a:t>1/5/17</a:t>
+              <a:t>5/1/24</a:t>
             </a:fld>
             <a:endParaRPr lang="en-US"/>
           </a:p>
@@ -732,10 +743,9 @@
           <a:lstStyle/>
           <a:p>
             <a:r>
-              <a:rPr lang="en-US" smtClean="0"/>
+              <a:rPr lang="en-US"/>
               <a:t>Click to edit Master title style</a:t>
             </a:r>
-            <a:endParaRPr lang="en-US"/>
           </a:p>
         </p:txBody>
       </p:sp>
@@ -756,38 +766,37 @@
           <a:p>
             <a:pPr lvl="0"/>
             <a:r>
-              <a:rPr lang="en-US" smtClean="0"/>
+              <a:rPr lang="en-US"/>
               <a:t>Click to edit Master text styles</a:t>
             </a:r>
           </a:p>
           <a:p>
             <a:pPr lvl="1"/>
             <a:r>
-              <a:rPr lang="en-US" smtClean="0"/>
+              <a:rPr lang="en-US"/>
               <a:t>Second level</a:t>
             </a:r>
           </a:p>
           <a:p>
             <a:pPr lvl="2"/>
             <a:r>
-              <a:rPr lang="en-US" smtClean="0"/>
+              <a:rPr lang="en-US"/>
               <a:t>Third level</a:t>
             </a:r>
           </a:p>
           <a:p>
             <a:pPr lvl="3"/>
             <a:r>
-              <a:rPr lang="en-US" smtClean="0"/>
+              <a:rPr lang="en-US"/>
               <a:t>Fourth level</a:t>
             </a:r>
           </a:p>
           <a:p>
             <a:pPr lvl="4"/>
             <a:r>
-              <a:rPr lang="en-US" smtClean="0"/>
+              <a:rPr lang="en-US"/>
               <a:t>Fifth level</a:t>
             </a:r>
-            <a:endParaRPr lang="en-US"/>
           </a:p>
         </p:txBody>
       </p:sp>
@@ -808,7 +817,7 @@
           <a:p>
             <a:fld id="{A8BA42CD-F487-0240-8209-992C51929464}" type="datetimeFigureOut">
               <a:rPr lang="en-US" smtClean="0"/>
-              <a:t>1/5/17</a:t>
+              <a:t>5/1/24</a:t>
             </a:fld>
             <a:endParaRPr lang="en-US"/>
           </a:p>
@@ -911,10 +920,9 @@
           </a:lstStyle>
           <a:p>
             <a:r>
-              <a:rPr lang="en-US" smtClean="0"/>
+              <a:rPr lang="en-US"/>
               <a:t>Click to edit Master title style</a:t>
             </a:r>
-            <a:endParaRPr lang="en-US"/>
           </a:p>
         </p:txBody>
       </p:sp>
@@ -1031,7 +1039,7 @@
           <a:p>
             <a:pPr lvl="0"/>
             <a:r>
-              <a:rPr lang="en-US" smtClean="0"/>
+              <a:rPr lang="en-US"/>
               <a:t>Click to edit Master text styles</a:t>
             </a:r>
           </a:p>
@@ -1054,7 +1062,7 @@
           <a:p>
             <a:fld id="{A8BA42CD-F487-0240-8209-992C51929464}" type="datetimeFigureOut">
               <a:rPr lang="en-US" smtClean="0"/>
-              <a:t>1/5/17</a:t>
+              <a:t>5/1/24</a:t>
             </a:fld>
             <a:endParaRPr lang="en-US"/>
           </a:p>
@@ -1148,10 +1156,9 @@
           <a:lstStyle/>
           <a:p>
             <a:r>
-              <a:rPr lang="en-US" smtClean="0"/>
+              <a:rPr lang="en-US"/>
               <a:t>Click to edit Master title style</a:t>
             </a:r>
-            <a:endParaRPr lang="en-US"/>
           </a:p>
         </p:txBody>
       </p:sp>
@@ -1205,38 +1212,37 @@
           <a:p>
             <a:pPr lvl="0"/>
             <a:r>
-              <a:rPr lang="en-US" smtClean="0"/>
+              <a:rPr lang="en-US"/>
               <a:t>Click to edit Master text styles</a:t>
             </a:r>
           </a:p>
           <a:p>
             <a:pPr lvl="1"/>
             <a:r>
-              <a:rPr lang="en-US" smtClean="0"/>
+              <a:rPr lang="en-US"/>
               <a:t>Second level</a:t>
             </a:r>
           </a:p>
           <a:p>
             <a:pPr lvl="2"/>
             <a:r>
-              <a:rPr lang="en-US" smtClean="0"/>
+              <a:rPr lang="en-US"/>
               <a:t>Third level</a:t>
             </a:r>
           </a:p>
           <a:p>
             <a:pPr lvl="3"/>
             <a:r>
-              <a:rPr lang="en-US" smtClean="0"/>
+              <a:rPr lang="en-US"/>
               <a:t>Fourth level</a:t>
             </a:r>
           </a:p>
           <a:p>
             <a:pPr lvl="4"/>
             <a:r>
-              <a:rPr lang="en-US" smtClean="0"/>
+              <a:rPr lang="en-US"/>
               <a:t>Fifth level</a:t>
             </a:r>
-            <a:endParaRPr lang="en-US"/>
           </a:p>
         </p:txBody>
       </p:sp>
@@ -1290,38 +1296,37 @@
           <a:p>
             <a:pPr lvl="0"/>
             <a:r>
-              <a:rPr lang="en-US" smtClean="0"/>
+              <a:rPr lang="en-US"/>
               <a:t>Click to edit Master text styles</a:t>
             </a:r>
           </a:p>
           <a:p>
             <a:pPr lvl="1"/>
             <a:r>
-              <a:rPr lang="en-US" smtClean="0"/>
+              <a:rPr lang="en-US"/>
               <a:t>Second level</a:t>
             </a:r>
           </a:p>
           <a:p>
             <a:pPr lvl="2"/>
             <a:r>
-              <a:rPr lang="en-US" smtClean="0"/>
+              <a:rPr lang="en-US"/>
               <a:t>Third level</a:t>
             </a:r>
           </a:p>
           <a:p>
             <a:pPr lvl="3"/>
             <a:r>
-              <a:rPr lang="en-US" smtClean="0"/>
+              <a:rPr lang="en-US"/>
               <a:t>Fourth level</a:t>
             </a:r>
           </a:p>
           <a:p>
             <a:pPr lvl="4"/>
             <a:r>
-              <a:rPr lang="en-US" smtClean="0"/>
+              <a:rPr lang="en-US"/>
               <a:t>Fifth level</a:t>
             </a:r>
-            <a:endParaRPr lang="en-US"/>
           </a:p>
         </p:txBody>
       </p:sp>
@@ -1342,7 +1347,7 @@
           <a:p>
             <a:fld id="{A8BA42CD-F487-0240-8209-992C51929464}" type="datetimeFigureOut">
               <a:rPr lang="en-US" smtClean="0"/>
-              <a:t>1/5/17</a:t>
+              <a:t>5/1/24</a:t>
             </a:fld>
             <a:endParaRPr lang="en-US"/>
           </a:p>
@@ -1440,10 +1445,9 @@
           </a:lstStyle>
           <a:p>
             <a:r>
-              <a:rPr lang="en-US" smtClean="0"/>
+              <a:rPr lang="en-US"/>
               <a:t>Click to edit Master title style</a:t>
             </a:r>
-            <a:endParaRPr lang="en-US"/>
           </a:p>
         </p:txBody>
       </p:sp>
@@ -1506,7 +1510,7 @@
           <a:p>
             <a:pPr lvl="0"/>
             <a:r>
-              <a:rPr lang="en-US" smtClean="0"/>
+              <a:rPr lang="en-US"/>
               <a:t>Click to edit Master text styles</a:t>
             </a:r>
           </a:p>
@@ -1562,38 +1566,37 @@
           <a:p>
             <a:pPr lvl="0"/>
             <a:r>
-              <a:rPr lang="en-US" smtClean="0"/>
+              <a:rPr lang="en-US"/>
               <a:t>Click to edit Master text styles</a:t>
             </a:r>
           </a:p>
           <a:p>
             <a:pPr lvl="1"/>
             <a:r>
-              <a:rPr lang="en-US" smtClean="0"/>
+              <a:rPr lang="en-US"/>
               <a:t>Second level</a:t>
             </a:r>
           </a:p>
           <a:p>
             <a:pPr lvl="2"/>
             <a:r>
-              <a:rPr lang="en-US" smtClean="0"/>
+              <a:rPr lang="en-US"/>
               <a:t>Third level</a:t>
             </a:r>
           </a:p>
           <a:p>
             <a:pPr lvl="3"/>
             <a:r>
-              <a:rPr lang="en-US" smtClean="0"/>
+              <a:rPr lang="en-US"/>
               <a:t>Fourth level</a:t>
             </a:r>
           </a:p>
           <a:p>
             <a:pPr lvl="4"/>
             <a:r>
-              <a:rPr lang="en-US" smtClean="0"/>
+              <a:rPr lang="en-US"/>
               <a:t>Fifth level</a:t>
             </a:r>
-            <a:endParaRPr lang="en-US"/>
           </a:p>
         </p:txBody>
       </p:sp>
@@ -1656,7 +1659,7 @@
           <a:p>
             <a:pPr lvl="0"/>
             <a:r>
-              <a:rPr lang="en-US" smtClean="0"/>
+              <a:rPr lang="en-US"/>
               <a:t>Click to edit Master text styles</a:t>
             </a:r>
           </a:p>
@@ -1712,38 +1715,37 @@
           <a:p>
             <a:pPr lvl="0"/>
             <a:r>
-              <a:rPr lang="en-US" smtClean="0"/>
+              <a:rPr lang="en-US"/>
               <a:t>Click to edit Master text styles</a:t>
             </a:r>
           </a:p>
           <a:p>
             <a:pPr lvl="1"/>
             <a:r>
-              <a:rPr lang="en-US" smtClean="0"/>
+              <a:rPr lang="en-US"/>
               <a:t>Second level</a:t>
             </a:r>
           </a:p>
           <a:p>
             <a:pPr lvl="2"/>
             <a:r>
-              <a:rPr lang="en-US" smtClean="0"/>
+              <a:rPr lang="en-US"/>
               <a:t>Third level</a:t>
             </a:r>
           </a:p>
           <a:p>
             <a:pPr lvl="3"/>
             <a:r>
-              <a:rPr lang="en-US" smtClean="0"/>
+              <a:rPr lang="en-US"/>
               <a:t>Fourth level</a:t>
             </a:r>
           </a:p>
           <a:p>
             <a:pPr lvl="4"/>
             <a:r>
-              <a:rPr lang="en-US" smtClean="0"/>
+              <a:rPr lang="en-US"/>
               <a:t>Fifth level</a:t>
             </a:r>
-            <a:endParaRPr lang="en-US"/>
           </a:p>
         </p:txBody>
       </p:sp>
@@ -1764,7 +1766,7 @@
           <a:p>
             <a:fld id="{A8BA42CD-F487-0240-8209-992C51929464}" type="datetimeFigureOut">
               <a:rPr lang="en-US" smtClean="0"/>
-              <a:t>1/5/17</a:t>
+              <a:t>5/1/24</a:t>
             </a:fld>
             <a:endParaRPr lang="en-US"/>
           </a:p>
@@ -1858,10 +1860,9 @@
           <a:lstStyle/>
           <a:p>
             <a:r>
-              <a:rPr lang="en-US" smtClean="0"/>
+              <a:rPr lang="en-US"/>
               <a:t>Click to edit Master title style</a:t>
             </a:r>
-            <a:endParaRPr lang="en-US"/>
           </a:p>
         </p:txBody>
       </p:sp>
@@ -1882,7 +1883,7 @@
           <a:p>
             <a:fld id="{A8BA42CD-F487-0240-8209-992C51929464}" type="datetimeFigureOut">
               <a:rPr lang="en-US" smtClean="0"/>
-              <a:t>1/5/17</a:t>
+              <a:t>5/1/24</a:t>
             </a:fld>
             <a:endParaRPr lang="en-US"/>
           </a:p>
@@ -1977,7 +1978,7 @@
           <a:p>
             <a:fld id="{A8BA42CD-F487-0240-8209-992C51929464}" type="datetimeFigureOut">
               <a:rPr lang="en-US" smtClean="0"/>
-              <a:t>1/5/17</a:t>
+              <a:t>5/1/24</a:t>
             </a:fld>
             <a:endParaRPr lang="en-US"/>
           </a:p>
@@ -2080,10 +2081,9 @@
           </a:lstStyle>
           <a:p>
             <a:r>
-              <a:rPr lang="en-US" smtClean="0"/>
+              <a:rPr lang="en-US"/>
               <a:t>Click to edit Master title style</a:t>
             </a:r>
-            <a:endParaRPr lang="en-US"/>
           </a:p>
         </p:txBody>
       </p:sp>
@@ -2137,38 +2137,37 @@
           <a:p>
             <a:pPr lvl="0"/>
             <a:r>
-              <a:rPr lang="en-US" smtClean="0"/>
+              <a:rPr lang="en-US"/>
               <a:t>Click to edit Master text styles</a:t>
             </a:r>
           </a:p>
           <a:p>
             <a:pPr lvl="1"/>
             <a:r>
-              <a:rPr lang="en-US" smtClean="0"/>
+              <a:rPr lang="en-US"/>
               <a:t>Second level</a:t>
             </a:r>
           </a:p>
           <a:p>
             <a:pPr lvl="2"/>
             <a:r>
-              <a:rPr lang="en-US" smtClean="0"/>
+              <a:rPr lang="en-US"/>
               <a:t>Third level</a:t>
             </a:r>
           </a:p>
           <a:p>
             <a:pPr lvl="3"/>
             <a:r>
-              <a:rPr lang="en-US" smtClean="0"/>
+              <a:rPr lang="en-US"/>
               <a:t>Fourth level</a:t>
             </a:r>
           </a:p>
           <a:p>
             <a:pPr lvl="4"/>
             <a:r>
-              <a:rPr lang="en-US" smtClean="0"/>
+              <a:rPr lang="en-US"/>
               <a:t>Fifth level</a:t>
             </a:r>
-            <a:endParaRPr lang="en-US"/>
           </a:p>
         </p:txBody>
       </p:sp>
@@ -2231,7 +2230,7 @@
           <a:p>
             <a:pPr lvl="0"/>
             <a:r>
-              <a:rPr lang="en-US" smtClean="0"/>
+              <a:rPr lang="en-US"/>
               <a:t>Click to edit Master text styles</a:t>
             </a:r>
           </a:p>
@@ -2254,7 +2253,7 @@
           <a:p>
             <a:fld id="{A8BA42CD-F487-0240-8209-992C51929464}" type="datetimeFigureOut">
               <a:rPr lang="en-US" smtClean="0"/>
-              <a:t>1/5/17</a:t>
+              <a:t>5/1/24</a:t>
             </a:fld>
             <a:endParaRPr lang="en-US"/>
           </a:p>
@@ -2357,10 +2356,9 @@
           </a:lstStyle>
           <a:p>
             <a:r>
-              <a:rPr lang="en-US" smtClean="0"/>
+              <a:rPr lang="en-US"/>
               <a:t>Click to edit Master title style</a:t>
             </a:r>
-            <a:endParaRPr lang="en-US"/>
           </a:p>
         </p:txBody>
       </p:sp>
@@ -2484,7 +2482,7 @@
           <a:p>
             <a:pPr lvl="0"/>
             <a:r>
-              <a:rPr lang="en-US" smtClean="0"/>
+              <a:rPr lang="en-US"/>
               <a:t>Click to edit Master text styles</a:t>
             </a:r>
           </a:p>
@@ -2507,7 +2505,7 @@
           <a:p>
             <a:fld id="{A8BA42CD-F487-0240-8209-992C51929464}" type="datetimeFigureOut">
               <a:rPr lang="en-US" smtClean="0"/>
-              <a:t>1/5/17</a:t>
+              <a:t>5/1/24</a:t>
             </a:fld>
             <a:endParaRPr lang="en-US"/>
           </a:p>
@@ -2616,10 +2614,9 @@
           <a:lstStyle/>
           <a:p>
             <a:r>
-              <a:rPr lang="en-US" smtClean="0"/>
+              <a:rPr lang="en-US"/>
               <a:t>Click to edit Master title style</a:t>
             </a:r>
-            <a:endParaRPr lang="en-US"/>
           </a:p>
         </p:txBody>
       </p:sp>
@@ -2650,38 +2647,37 @@
           <a:p>
             <a:pPr lvl="0"/>
             <a:r>
-              <a:rPr lang="en-US" smtClean="0"/>
+              <a:rPr lang="en-US"/>
               <a:t>Click to edit Master text styles</a:t>
             </a:r>
           </a:p>
           <a:p>
             <a:pPr lvl="1"/>
             <a:r>
-              <a:rPr lang="en-US" smtClean="0"/>
+              <a:rPr lang="en-US"/>
               <a:t>Second level</a:t>
             </a:r>
           </a:p>
           <a:p>
             <a:pPr lvl="2"/>
             <a:r>
-              <a:rPr lang="en-US" smtClean="0"/>
+              <a:rPr lang="en-US"/>
               <a:t>Third level</a:t>
             </a:r>
           </a:p>
           <a:p>
             <a:pPr lvl="3"/>
             <a:r>
-              <a:rPr lang="en-US" smtClean="0"/>
+              <a:rPr lang="en-US"/>
               <a:t>Fourth level</a:t>
             </a:r>
           </a:p>
           <a:p>
             <a:pPr lvl="4"/>
             <a:r>
-              <a:rPr lang="en-US" smtClean="0"/>
+              <a:rPr lang="en-US"/>
               <a:t>Fifth level</a:t>
             </a:r>
-            <a:endParaRPr lang="en-US"/>
           </a:p>
         </p:txBody>
       </p:sp>
@@ -2720,7 +2716,7 @@
           <a:p>
             <a:fld id="{A8BA42CD-F487-0240-8209-992C51929464}" type="datetimeFigureOut">
               <a:rPr lang="en-US" smtClean="0"/>
-              <a:t>1/5/17</a:t>
+              <a:t>5/1/24</a:t>
             </a:fld>
             <a:endParaRPr lang="en-US"/>
           </a:p>
@@ -3111,10 +3107,9 @@
           <a:lstStyle/>
           <a:p>
             <a:r>
-              <a:rPr lang="en-US" smtClean="0"/>
+              <a:rPr lang="en-US"/>
               <a:t>hello</a:t>
             </a:r>
-            <a:endParaRPr lang="en-US"/>
           </a:p>
         </p:txBody>
       </p:sp>
@@ -3133,7 +3128,10 @@
           <a:bodyPr/>
           <a:lstStyle/>
           <a:p>
-            <a:endParaRPr lang="en-US"/>
+            <a:r>
+              <a:rPr lang="en-US" dirty="0"/>
+              <a:t>How are you doing</a:t>
+            </a:r>
           </a:p>
         </p:txBody>
       </p:sp>
@@ -3141,6 +3139,101 @@
     <p:extLst>
       <p:ext uri="{BB962C8B-B14F-4D97-AF65-F5344CB8AC3E}">
         <p14:creationId xmlns:p14="http://schemas.microsoft.com/office/powerpoint/2010/main" val="1870578988"/>
+      </p:ext>
+    </p:extLst>
+  </p:cSld>
+  <p:clrMapOvr>
+    <a:masterClrMapping/>
+  </p:clrMapOvr>
+</p:sld>
+</file>
+
+<file path=ppt/slides/slide2.xml><?xml version="1.0" encoding="utf-8"?>
+<p:sld xmlns:a="http://schemas.openxmlformats.org/drawingml/2006/main" xmlns:r="http://schemas.openxmlformats.org/officeDocument/2006/relationships" xmlns:p="http://schemas.openxmlformats.org/presentationml/2006/main">
+  <p:cSld>
+    <p:spTree>
+      <p:nvGrpSpPr>
+        <p:cNvPr id="1" name=""/>
+        <p:cNvGrpSpPr/>
+        <p:nvPr/>
+      </p:nvGrpSpPr>
+      <p:grpSpPr>
+        <a:xfrm>
+          <a:off x="0" y="0"/>
+          <a:ext cx="0" cy="0"/>
+          <a:chOff x="0" y="0"/>
+          <a:chExt cx="0" cy="0"/>
+        </a:xfrm>
+      </p:grpSpPr>
+      <p:sp>
+        <p:nvSpPr>
+          <p:cNvPr id="2" name="Title 1">
+            <a:extLst>
+              <a:ext uri="{FF2B5EF4-FFF2-40B4-BE49-F238E27FC236}">
+                <a16:creationId xmlns:a16="http://schemas.microsoft.com/office/drawing/2014/main" id="{0FC9588E-55CC-C009-60A9-93659D7BEC60}"/>
+              </a:ext>
+            </a:extLst>
+          </p:cNvPr>
+          <p:cNvSpPr>
+            <a:spLocks noGrp="1"/>
+          </p:cNvSpPr>
+          <p:nvPr>
+            <p:ph type="title"/>
+          </p:nvPr>
+        </p:nvSpPr>
+        <p:spPr/>
+        <p:txBody>
+          <a:bodyPr/>
+          <a:lstStyle/>
+          <a:p>
+            <a:r>
+              <a:rPr lang="en-US" dirty="0"/>
+              <a:t>Good </a:t>
+            </a:r>
+            <a:r>
+              <a:rPr lang="en-US" dirty="0" err="1"/>
+              <a:t>moarning</a:t>
+            </a:r>
+            <a:endParaRPr lang="en-US" dirty="0"/>
+          </a:p>
+        </p:txBody>
+      </p:sp>
+      <p:sp>
+        <p:nvSpPr>
+          <p:cNvPr id="3" name="Content Placeholder 2">
+            <a:extLst>
+              <a:ext uri="{FF2B5EF4-FFF2-40B4-BE49-F238E27FC236}">
+                <a16:creationId xmlns:a16="http://schemas.microsoft.com/office/drawing/2014/main" id="{CFE27495-941B-FBFB-63EB-D27B44DE9D0B}"/>
+              </a:ext>
+            </a:extLst>
+          </p:cNvPr>
+          <p:cNvSpPr>
+            <a:spLocks noGrp="1"/>
+          </p:cNvSpPr>
+          <p:nvPr>
+            <p:ph idx="1"/>
+          </p:nvPr>
+        </p:nvSpPr>
+        <p:spPr/>
+        <p:txBody>
+          <a:bodyPr/>
+          <a:lstStyle/>
+          <a:p>
+            <a:r>
+              <a:rPr lang="en-US" dirty="0"/>
+              <a:t>This is </a:t>
+            </a:r>
+            <a:r>
+              <a:rPr lang="en-US"/>
+              <a:t>a solution</a:t>
+            </a:r>
+          </a:p>
+        </p:txBody>
+      </p:sp>
+    </p:spTree>
+    <p:extLst>
+      <p:ext uri="{BB962C8B-B14F-4D97-AF65-F5344CB8AC3E}">
+        <p14:creationId xmlns:p14="http://schemas.microsoft.com/office/powerpoint/2010/main" val="201333807"/>
       </p:ext>
     </p:extLst>
   </p:cSld>

</xml_diff>